<commit_message>
Final versions of Ians talks
</commit_message>
<xml_diff>
--- a/Lectures/pptx/3_Lecture_three.pptx
+++ b/Lectures/pptx/3_Lecture_three.pptx
@@ -5,10 +5,10 @@
     <p:sldMasterId id="2147483652" r:id="rId4"/>
   </p:sldMasterIdLst>
   <p:notesMasterIdLst>
-    <p:notesMasterId r:id="rId27"/>
+    <p:notesMasterId r:id="rId26"/>
   </p:notesMasterIdLst>
   <p:handoutMasterIdLst>
-    <p:handoutMasterId r:id="rId28"/>
+    <p:handoutMasterId r:id="rId27"/>
   </p:handoutMasterIdLst>
   <p:sldIdLst>
     <p:sldId id="261" r:id="rId5"/>
@@ -31,8 +31,7 @@
     <p:sldId id="475" r:id="rId22"/>
     <p:sldId id="477" r:id="rId23"/>
     <p:sldId id="439" r:id="rId24"/>
-    <p:sldId id="460" r:id="rId25"/>
-    <p:sldId id="440" r:id="rId26"/>
+    <p:sldId id="440" r:id="rId25"/>
   </p:sldIdLst>
   <p:sldSz cx="9144000" cy="6858000" type="screen4x3"/>
   <p:notesSz cx="6858000" cy="9144000"/>
@@ -1187,132 +1186,6 @@
 </file>
 
 <file path=ppt/notesSlides/notesSlide3.xml><?xml version="1.0" encoding="utf-8"?>
-<p:notes xmlns:a="http://schemas.openxmlformats.org/drawingml/2006/main" xmlns:r="http://schemas.openxmlformats.org/officeDocument/2006/relationships" xmlns:p="http://schemas.openxmlformats.org/presentationml/2006/main">
-  <p:cSld>
-    <p:spTree>
-      <p:nvGrpSpPr>
-        <p:cNvPr id="1" name=""/>
-        <p:cNvGrpSpPr/>
-        <p:nvPr/>
-      </p:nvGrpSpPr>
-      <p:grpSpPr>
-        <a:xfrm>
-          <a:off x="0" y="0"/>
-          <a:ext cx="0" cy="0"/>
-          <a:chOff x="0" y="0"/>
-          <a:chExt cx="0" cy="0"/>
-        </a:xfrm>
-      </p:grpSpPr>
-      <p:sp>
-        <p:nvSpPr>
-          <p:cNvPr id="22529" name="Rectangle 1"/>
-          <p:cNvSpPr>
-            <a:spLocks noGrp="1" noRot="1" noChangeAspect="1" noChangeArrowheads="1"/>
-          </p:cNvSpPr>
-          <p:nvPr>
-            <p:ph type="sldImg"/>
-          </p:nvPr>
-        </p:nvSpPr>
-        <p:spPr bwMode="auto">
-          <a:xfrm>
-            <a:off x="1143000" y="685800"/>
-            <a:ext cx="4572000" cy="3429000"/>
-          </a:xfrm>
-          <a:prstGeom prst="rect">
-            <a:avLst/>
-          </a:prstGeom>
-          <a:solidFill>
-            <a:srgbClr val="FFFFFF"/>
-          </a:solidFill>
-          <a:ln>
-            <a:solidFill>
-              <a:srgbClr val="000000"/>
-            </a:solidFill>
-            <a:miter lim="800000"/>
-            <a:headEnd/>
-            <a:tailEnd/>
-          </a:ln>
-        </p:spPr>
-      </p:sp>
-      <p:sp>
-        <p:nvSpPr>
-          <p:cNvPr id="22530" name="Rectangle 2"/>
-          <p:cNvSpPr>
-            <a:spLocks noGrp="1" noChangeArrowheads="1"/>
-          </p:cNvSpPr>
-          <p:nvPr>
-            <p:ph type="body" idx="1"/>
-          </p:nvPr>
-        </p:nvSpPr>
-        <p:spPr bwMode="auto">
-          <a:xfrm>
-            <a:off x="685800" y="4343400"/>
-            <a:ext cx="5486400" cy="4114800"/>
-          </a:xfrm>
-          <a:prstGeom prst="rect">
-            <a:avLst/>
-          </a:prstGeom>
-          <a:noFill/>
-          <a:ln/>
-          <a:extLst>
-            <a:ext uri="{909E8E84-426E-40DD-AFC4-6F175D3DCCD1}">
-              <a14:hiddenFill xmlns:a14="http://schemas.microsoft.com/office/drawing/2010/main">
-                <a:solidFill>
-                  <a:srgbClr val="FFFFFF"/>
-                </a:solidFill>
-              </a14:hiddenFill>
-            </a:ext>
-            <a:ext uri="{91240B29-F687-4F45-9708-019B960494DF}">
-              <a14:hiddenLine xmlns:a14="http://schemas.microsoft.com/office/drawing/2010/main" w="9525">
-                <a:solidFill>
-                  <a:srgbClr val="000000"/>
-                </a:solidFill>
-                <a:miter lim="800000"/>
-                <a:headEnd/>
-                <a:tailEnd/>
-              </a14:hiddenLine>
-            </a:ext>
-            <a:ext uri="{AF507438-7753-43E0-B8FC-AC1667EBCBE1}">
-              <a14:hiddenEffects xmlns:a14="http://schemas.microsoft.com/office/drawing/2010/main">
-                <a:effectLst>
-                  <a:outerShdw dist="35921" dir="2700000" algn="ctr" rotWithShape="0">
-                    <a:srgbClr val="808080"/>
-                  </a:outerShdw>
-                </a:effectLst>
-              </a14:hiddenEffects>
-            </a:ext>
-            <a:ext uri="{53640926-AAD7-44D8-BBD7-CCE9431645EC}">
-              <a14:shadowObscured xmlns:a14="http://schemas.microsoft.com/office/drawing/2010/main" val="1"/>
-            </a:ext>
-          </a:extLst>
-        </p:spPr>
-        <p:txBody>
-          <a:bodyPr/>
-          <a:lstStyle/>
-          <a:p>
-            <a:endParaRPr lang="en-US" altLang="en-US" sz="2200" dirty="0">
-              <a:latin typeface="Lucida Grande" charset="0"/>
-              <a:ea typeface="Lucida Grande" charset="0"/>
-              <a:cs typeface="Lucida Grande" charset="0"/>
-              <a:sym typeface="Lucida Grande" charset="0"/>
-            </a:endParaRPr>
-          </a:p>
-        </p:txBody>
-      </p:sp>
-    </p:spTree>
-    <p:extLst>
-      <p:ext uri="{BB962C8B-B14F-4D97-AF65-F5344CB8AC3E}">
-        <p14:creationId xmlns:p14="http://schemas.microsoft.com/office/powerpoint/2010/main" val="3043982907"/>
-      </p:ext>
-    </p:extLst>
-  </p:cSld>
-  <p:clrMapOvr>
-    <a:masterClrMapping/>
-  </p:clrMapOvr>
-</p:notes>
-</file>
-
-<file path=ppt/notesSlides/notesSlide4.xml><?xml version="1.0" encoding="utf-8"?>
 <p:notes xmlns:a="http://schemas.openxmlformats.org/drawingml/2006/main" xmlns:r="http://schemas.openxmlformats.org/officeDocument/2006/relationships" xmlns:p="http://schemas.openxmlformats.org/presentationml/2006/main">
   <p:cSld>
     <p:spTree>
@@ -5205,8 +5078,8 @@
         </p:nvSpPr>
         <p:spPr bwMode="auto">
           <a:xfrm>
-            <a:off x="1223628" y="3861048"/>
-            <a:ext cx="6696744" cy="504056"/>
+            <a:off x="323528" y="3861048"/>
+            <a:ext cx="8496944" cy="504056"/>
           </a:xfrm>
           <a:prstGeom prst="rect">
             <a:avLst/>
@@ -5418,20 +5291,12 @@
               </a:lnSpc>
             </a:pPr>
             <a:r>
-              <a:rPr lang="en-GB" sz="2400" kern="0" dirty="0" smtClean="0">
+              <a:rPr lang="en-GB" sz="2400" kern="0">
                 <a:solidFill>
                   <a:srgbClr val="000000"/>
                 </a:solidFill>
               </a:rPr>
-              <a:t>Lecture three: Introduction </a:t>
-            </a:r>
-            <a:r>
-              <a:rPr lang="en-GB" sz="2400" kern="0" dirty="0">
-                <a:solidFill>
-                  <a:srgbClr val="000000"/>
-                </a:solidFill>
-              </a:rPr>
-              <a:t>to Linux, compilers and build systems</a:t>
+              <a:t>Introduction to Linux, compilers and build systems</a:t>
             </a:r>
             <a:endParaRPr lang="en-US" sz="2400" kern="0" dirty="0" smtClean="0">
               <a:solidFill>
@@ -6672,7 +6537,7 @@
           <a:effectLst/>
           <a:extLst>
             <a:ext uri="{AF507438-7753-43e0-B8FC-AC1667EBCBE1}">
-              <a14:hiddenEffects xmlns="" xmlns:a14="http://schemas.microsoft.com/office/drawing/2010/main">
+              <a14:hiddenEffects xmlns:a14="http://schemas.microsoft.com/office/drawing/2010/main" xmlns="">
                 <a:effectLst>
                   <a:outerShdw blurRad="63500" dist="38099" dir="2700000" algn="ctr" rotWithShape="0">
                     <a:schemeClr val="bg2">
@@ -6753,7 +6618,7 @@
           <a:effectLst/>
           <a:extLst>
             <a:ext uri="{AF507438-7753-43e0-B8FC-AC1667EBCBE1}">
-              <a14:hiddenEffects xmlns="" xmlns:a14="http://schemas.microsoft.com/office/drawing/2010/main">
+              <a14:hiddenEffects xmlns:a14="http://schemas.microsoft.com/office/drawing/2010/main" xmlns="">
                 <a:effectLst>
                   <a:outerShdw blurRad="63500" dist="38099" dir="2700000" algn="ctr" rotWithShape="0">
                     <a:schemeClr val="bg2">
@@ -6839,7 +6704,7 @@
           <a:effectLst/>
           <a:extLst>
             <a:ext uri="{AF507438-7753-43e0-B8FC-AC1667EBCBE1}">
-              <a14:hiddenEffects xmlns="" xmlns:a14="http://schemas.microsoft.com/office/drawing/2010/main">
+              <a14:hiddenEffects xmlns:a14="http://schemas.microsoft.com/office/drawing/2010/main" xmlns="">
                 <a:effectLst>
                   <a:outerShdw blurRad="63500" dist="38099" dir="2700000" algn="ctr" rotWithShape="0">
                     <a:schemeClr val="bg2">
@@ -6955,7 +6820,7 @@
           <a:effectLst/>
           <a:extLst>
             <a:ext uri="{AF507438-7753-43e0-B8FC-AC1667EBCBE1}">
-              <a14:hiddenEffects xmlns="" xmlns:a14="http://schemas.microsoft.com/office/drawing/2010/main">
+              <a14:hiddenEffects xmlns:a14="http://schemas.microsoft.com/office/drawing/2010/main" xmlns="">
                 <a:effectLst>
                   <a:outerShdw blurRad="63500" dist="38099" dir="2700000" algn="ctr" rotWithShape="0">
                     <a:schemeClr val="bg2">
@@ -7746,90 +7611,6 @@
                 </a:solidFill>
                 <a:latin typeface="Arial" panose="020B0604020202020204" pitchFamily="34" charset="0"/>
               </a:rPr>
-              <a:t>Further reading</a:t>
-            </a:r>
-            <a:endParaRPr lang="en-GB" b="1" dirty="0">
-              <a:solidFill>
-                <a:schemeClr val="bg1"/>
-              </a:solidFill>
-              <a:latin typeface="Arial" panose="020B0604020202020204" pitchFamily="34" charset="0"/>
-            </a:endParaRPr>
-          </a:p>
-        </p:txBody>
-      </p:sp>
-    </p:spTree>
-    <p:extLst>
-      <p:ext uri="{BB962C8B-B14F-4D97-AF65-F5344CB8AC3E}">
-        <p14:creationId xmlns:p14="http://schemas.microsoft.com/office/powerpoint/2010/main" val="3823330968"/>
-      </p:ext>
-    </p:extLst>
-  </p:cSld>
-  <p:clrMapOvr>
-    <a:masterClrMapping/>
-  </p:clrMapOvr>
-  <mc:AlternateContent xmlns:mc="http://schemas.openxmlformats.org/markup-compatibility/2006" xmlns:p14="http://schemas.microsoft.com/office/powerpoint/2010/main">
-    <mc:Choice Requires="p14">
-      <p:transition spd="slow" p14:dur="2000"/>
-    </mc:Choice>
-    <mc:Fallback xmlns="">
-      <p:transition spd="slow"/>
-    </mc:Fallback>
-  </mc:AlternateContent>
-  <p:timing>
-    <p:tnLst>
-      <p:par>
-        <p:cTn id="1" dur="indefinite" restart="never" nodeType="tmRoot"/>
-      </p:par>
-    </p:tnLst>
-  </p:timing>
-</p:sld>
-</file>
-
-<file path=ppt/slides/slide22.xml><?xml version="1.0" encoding="utf-8"?>
-<p:sld xmlns:a="http://schemas.openxmlformats.org/drawingml/2006/main" xmlns:r="http://schemas.openxmlformats.org/officeDocument/2006/relationships" xmlns:p="http://schemas.openxmlformats.org/presentationml/2006/main">
-  <p:cSld>
-    <p:spTree>
-      <p:nvGrpSpPr>
-        <p:cNvPr id="1" name=""/>
-        <p:cNvGrpSpPr/>
-        <p:nvPr/>
-      </p:nvGrpSpPr>
-      <p:grpSpPr>
-        <a:xfrm>
-          <a:off x="0" y="0"/>
-          <a:ext cx="0" cy="0"/>
-          <a:chOff x="0" y="0"/>
-          <a:chExt cx="0" cy="0"/>
-        </a:xfrm>
-      </p:grpSpPr>
-      <p:sp>
-        <p:nvSpPr>
-          <p:cNvPr id="7" name="Rectangle 6"/>
-          <p:cNvSpPr/>
-          <p:nvPr/>
-        </p:nvSpPr>
-        <p:spPr>
-          <a:xfrm>
-            <a:off x="467544" y="476672"/>
-            <a:ext cx="7056784" cy="461665"/>
-          </a:xfrm>
-          <a:prstGeom prst="rect">
-            <a:avLst/>
-          </a:prstGeom>
-        </p:spPr>
-        <p:txBody>
-          <a:bodyPr wrap="square">
-            <a:spAutoFit/>
-          </a:bodyPr>
-          <a:lstStyle/>
-          <a:p>
-            <a:r>
-              <a:rPr lang="en-GB" b="1" dirty="0" smtClean="0">
-                <a:solidFill>
-                  <a:schemeClr val="bg1"/>
-                </a:solidFill>
-                <a:latin typeface="Arial" panose="020B0604020202020204" pitchFamily="34" charset="0"/>
-              </a:rPr>
               <a:t>In the next lecture…</a:t>
             </a:r>
             <a:endParaRPr lang="en-GB" b="1" dirty="0">
@@ -7871,10 +7652,18 @@
                 <a:latin typeface="Arial" panose="020B0604020202020204"/>
                 <a:cs typeface="Courier New" panose="02070309020205020404" pitchFamily="49" charset="0"/>
               </a:rPr>
-              <a:t>&lt;A synopsis of the next lecture&gt;</a:t>
-            </a:r>
-          </a:p>
-          <a:p>
+              <a:t>Tomorrow we will look at how to go </a:t>
+            </a:r>
+            <a:r>
+              <a:rPr lang="en-GB" sz="1400" smtClean="0">
+                <a:solidFill>
+                  <a:srgbClr val="C2470C"/>
+                </a:solidFill>
+                <a:latin typeface="Arial" panose="020B0604020202020204"/>
+                <a:cs typeface="Courier New" panose="02070309020205020404" pitchFamily="49" charset="0"/>
+              </a:rPr>
+              <a:t>about writing good code!</a:t>
+            </a:r>
             <a:endParaRPr lang="en-GB" sz="1400" dirty="0" smtClean="0">
               <a:solidFill>
                 <a:srgbClr val="C2470C"/>
@@ -9222,7 +9011,7 @@
         <a:effectLst/>
         <a:extLst>
           <a:ext uri="{AF507438-7753-43e0-B8FC-AC1667EBCBE1}">
-            <a14:hiddenEffects xmlns="" xmlns:a14="http://schemas.microsoft.com/office/drawing/2010/main">
+            <a14:hiddenEffects xmlns:a14="http://schemas.microsoft.com/office/drawing/2010/main" xmlns="">
               <a:effectLst>
                 <a:outerShdw blurRad="63500" dist="38099" dir="2700000" algn="ctr" rotWithShape="0">
                   <a:schemeClr val="bg2">
@@ -9298,7 +9087,7 @@
         <a:effectLst/>
         <a:extLst>
           <a:ext uri="{AF507438-7753-43e0-B8FC-AC1667EBCBE1}">
-            <a14:hiddenEffects xmlns="" xmlns:a14="http://schemas.microsoft.com/office/drawing/2010/main">
+            <a14:hiddenEffects xmlns:a14="http://schemas.microsoft.com/office/drawing/2010/main" xmlns="">
               <a:effectLst>
                 <a:outerShdw blurRad="63500" dist="38099" dir="2700000" algn="ctr" rotWithShape="0">
                   <a:schemeClr val="bg2">
@@ -10361,15 +10150,6 @@
 </file>
 
 <file path=customXml/item1.xml><?xml version="1.0" encoding="utf-8"?>
-<?mso-contentType ?>
-<FormTemplates xmlns="http://schemas.microsoft.com/sharepoint/v3/contenttype/forms">
-  <Display>DocumentLibraryForm</Display>
-  <Edit>DocumentLibraryForm</Edit>
-  <New>DocumentLibraryForm</New>
-</FormTemplates>
-</file>
-
-<file path=customXml/item2.xml><?xml version="1.0" encoding="utf-8"?>
 <ct:contentTypeSchema xmlns:ct="http://schemas.microsoft.com/office/2006/metadata/contentType" xmlns:ma="http://schemas.microsoft.com/office/2006/metadata/properties/metaAttributes" ct:_="" ma:_="" ma:contentTypeName="Document" ma:contentTypeID="0x010100F087B862386F8A48840A2142C0600765" ma:contentTypeVersion="1" ma:contentTypeDescription="Create a new document." ma:contentTypeScope="" ma:versionID="68e7a6ad2ab34d836eda56dc5c7bc733">
   <xsd:schema xmlns:xsd="http://www.w3.org/2001/XMLSchema" xmlns:xs="http://www.w3.org/2001/XMLSchema" xmlns:p="http://schemas.microsoft.com/office/2006/metadata/properties" xmlns:ns1="http://schemas.microsoft.com/sharepoint/v3" targetNamespace="http://schemas.microsoft.com/office/2006/metadata/properties" ma:root="true" ma:fieldsID="48c5b5cd9b8d25ff6dd15848836f4270" ns1:_="">
     <xsd:import namespace="http://schemas.microsoft.com/sharepoint/v3"/>
@@ -10501,6 +10281,15 @@
 </ct:contentTypeSchema>
 </file>
 
+<file path=customXml/item2.xml><?xml version="1.0" encoding="utf-8"?>
+<?mso-contentType ?>
+<FormTemplates xmlns="http://schemas.microsoft.com/sharepoint/v3/contenttype/forms">
+  <Display>DocumentLibraryForm</Display>
+  <Edit>DocumentLibraryForm</Edit>
+  <New>DocumentLibraryForm</New>
+</FormTemplates>
+</file>
+
 <file path=customXml/item3.xml><?xml version="1.0" encoding="utf-8"?>
 <p:properties xmlns:p="http://schemas.microsoft.com/office/2006/metadata/properties" xmlns:xsi="http://www.w3.org/2001/XMLSchema-instance" xmlns:pc="http://schemas.microsoft.com/office/infopath/2007/PartnerControls">
   <documentManagement>
@@ -10511,14 +10300,6 @@
 </file>
 
 <file path=customXml/itemProps1.xml><?xml version="1.0" encoding="utf-8"?>
-<ds:datastoreItem xmlns:ds="http://schemas.openxmlformats.org/officeDocument/2006/customXml" ds:itemID="{2E0637EC-CEA5-409F-B139-003005A14145}">
-  <ds:schemaRefs>
-    <ds:schemaRef ds:uri="http://schemas.microsoft.com/sharepoint/v3/contenttype/forms"/>
-  </ds:schemaRefs>
-</ds:datastoreItem>
-</file>
-
-<file path=customXml/itemProps2.xml><?xml version="1.0" encoding="utf-8"?>
 <ds:datastoreItem xmlns:ds="http://schemas.openxmlformats.org/officeDocument/2006/customXml" ds:itemID="{866DD9C6-787C-4079-86E8-1446954686C6}">
   <ds:schemaRefs>
     <ds:schemaRef ds:uri="http://schemas.microsoft.com/office/2006/metadata/contentType"/>
@@ -10536,16 +10317,24 @@
 </ds:datastoreItem>
 </file>
 
+<file path=customXml/itemProps2.xml><?xml version="1.0" encoding="utf-8"?>
+<ds:datastoreItem xmlns:ds="http://schemas.openxmlformats.org/officeDocument/2006/customXml" ds:itemID="{2E0637EC-CEA5-409F-B139-003005A14145}">
+  <ds:schemaRefs>
+    <ds:schemaRef ds:uri="http://schemas.microsoft.com/sharepoint/v3/contenttype/forms"/>
+  </ds:schemaRefs>
+</ds:datastoreItem>
+</file>
+
 <file path=customXml/itemProps3.xml><?xml version="1.0" encoding="utf-8"?>
 <ds:datastoreItem xmlns:ds="http://schemas.openxmlformats.org/officeDocument/2006/customXml" ds:itemID="{D83787E9-855B-43BD-8382-B7C63B9BC33D}">
   <ds:schemaRefs>
+    <ds:schemaRef ds:uri="http://schemas.microsoft.com/sharepoint/v3"/>
+    <ds:schemaRef ds:uri="http://purl.org/dc/terms/"/>
+    <ds:schemaRef ds:uri="http://schemas.openxmlformats.org/package/2006/metadata/core-properties"/>
     <ds:schemaRef ds:uri="http://schemas.microsoft.com/office/2006/documentManagement/types"/>
     <ds:schemaRef ds:uri="http://schemas.microsoft.com/office/infopath/2007/PartnerControls"/>
     <ds:schemaRef ds:uri="http://purl.org/dc/elements/1.1/"/>
     <ds:schemaRef ds:uri="http://schemas.microsoft.com/office/2006/metadata/properties"/>
-    <ds:schemaRef ds:uri="http://schemas.microsoft.com/sharepoint/v3"/>
-    <ds:schemaRef ds:uri="http://purl.org/dc/terms/"/>
-    <ds:schemaRef ds:uri="http://schemas.openxmlformats.org/package/2006/metadata/core-properties"/>
     <ds:schemaRef ds:uri="http://www.w3.org/XML/1998/namespace"/>
     <ds:schemaRef ds:uri="http://purl.org/dc/dcmitype/"/>
   </ds:schemaRefs>

</xml_diff>

<commit_message>
Added new content and updated some slides
</commit_message>
<xml_diff>
--- a/Lectures/pptx/3_Lecture_three.pptx
+++ b/Lectures/pptx/3_Lecture_three.pptx
@@ -5540,7 +5540,7 @@
         </p:blipFill>
         <p:spPr>
           <a:xfrm>
-            <a:off x="2016125" y="2365306"/>
+            <a:off x="2699792" y="2204864"/>
             <a:ext cx="4210050" cy="3362325"/>
           </a:xfrm>
           <a:prstGeom prst="rect">
@@ -5702,7 +5702,7 @@
         </p:blipFill>
         <p:spPr>
           <a:xfrm>
-            <a:off x="1619672" y="3501008"/>
+            <a:off x="2483768" y="3789040"/>
             <a:ext cx="4838700" cy="1905000"/>
           </a:xfrm>
           <a:prstGeom prst="rect">
@@ -5951,8 +5951,8 @@
         </p:nvSpPr>
         <p:spPr>
           <a:xfrm>
-            <a:off x="379413" y="1528763"/>
-            <a:ext cx="3760539" cy="4391025"/>
+            <a:off x="539552" y="2054076"/>
+            <a:ext cx="3760539" cy="3340397"/>
           </a:xfrm>
         </p:spPr>
         <p:txBody>
@@ -5987,14 +5987,29 @@
             <a:pPr lvl="1"/>
             <a:r>
               <a:rPr lang="en-GB" dirty="0" smtClean="0"/>
-              <a:t>Don’t worry, we will always provide this!</a:t>
-            </a:r>
-          </a:p>
-          <a:p>
-            <a:r>
-              <a:rPr lang="en-GB" dirty="0" smtClean="0"/>
-              <a:t>Note how it also automatically works out what files need to be compiled and only compiles them</a:t>
-            </a:r>
+              <a:t>Don’t worry, we will always provide this</a:t>
+            </a:r>
+            <a:r>
+              <a:rPr lang="en-GB" dirty="0" smtClean="0"/>
+              <a:t>!</a:t>
+            </a:r>
+          </a:p>
+          <a:p>
+            <a:pPr lvl="1"/>
+            <a:endParaRPr lang="en-GB" dirty="0" smtClean="0"/>
+          </a:p>
+          <a:p>
+            <a:r>
+              <a:rPr lang="en-GB" dirty="0" smtClean="0"/>
+              <a:t>Note how it also automatically works out what files need to be compiled and only compiles </a:t>
+            </a:r>
+            <a:r>
+              <a:rPr lang="en-GB" dirty="0" smtClean="0"/>
+              <a:t>them</a:t>
+            </a:r>
+          </a:p>
+          <a:p>
+            <a:endParaRPr lang="en-GB" dirty="0" smtClean="0"/>
           </a:p>
           <a:p>
             <a:r>
@@ -6010,11 +6025,13 @@
             </a:r>
             <a:r>
               <a:rPr lang="en-GB" dirty="0" smtClean="0"/>
-              <a:t>is very common – clean up and leave the files as they were before any compilation occurred</a:t>
-            </a:r>
-          </a:p>
-          <a:p>
-            <a:endParaRPr lang="en-GB" dirty="0"/>
+              <a:t>is very common – clean up and leave the files as they were before any compilation </a:t>
+            </a:r>
+            <a:r>
+              <a:rPr lang="en-GB" dirty="0" smtClean="0"/>
+              <a:t>occurred</a:t>
+            </a:r>
+            <a:endParaRPr lang="en-GB" dirty="0" smtClean="0"/>
           </a:p>
         </p:txBody>
       </p:sp>
@@ -6034,8 +6051,8 @@
         </p:blipFill>
         <p:spPr>
           <a:xfrm>
-            <a:off x="4572000" y="1268760"/>
-            <a:ext cx="4414562" cy="5039338"/>
+            <a:off x="4788024" y="1459043"/>
+            <a:ext cx="3968778" cy="4530464"/>
           </a:xfrm>
           <a:prstGeom prst="rect">
             <a:avLst/>
@@ -6119,8 +6136,15 @@
           <a:p>
             <a:r>
               <a:rPr lang="en-GB" dirty="0" smtClean="0"/>
-              <a:t>Arcus-b is the cluster we are running on</a:t>
-            </a:r>
+              <a:t>Arcus-b is the cluster we are running </a:t>
+            </a:r>
+            <a:r>
+              <a:rPr lang="en-GB" dirty="0" smtClean="0"/>
+              <a:t>on</a:t>
+            </a:r>
+          </a:p>
+          <a:p>
+            <a:endParaRPr lang="en-GB" dirty="0" smtClean="0"/>
           </a:p>
           <a:p>
             <a:r>
@@ -6179,8 +6203,16 @@
             </a:r>
             <a:r>
               <a:rPr lang="en-GB" dirty="0" smtClean="0"/>
-              <a:t> on arcus-b is restricted to at most 16 cores</a:t>
-            </a:r>
+              <a:t> on arcus-b is restricted to at most 16 </a:t>
+            </a:r>
+            <a:r>
+              <a:rPr lang="en-GB" dirty="0" smtClean="0"/>
+              <a:t>cores</a:t>
+            </a:r>
+          </a:p>
+          <a:p>
+            <a:pPr lvl="1"/>
+            <a:endParaRPr lang="en-GB" dirty="0" smtClean="0"/>
           </a:p>
           <a:p>
             <a:r>
@@ -6283,8 +6315,8 @@
         </p:nvSpPr>
         <p:spPr>
           <a:xfrm>
-            <a:off x="379413" y="1528763"/>
-            <a:ext cx="8081019" cy="4391025"/>
+            <a:off x="437827" y="1412776"/>
+            <a:ext cx="8081019" cy="1468189"/>
           </a:xfrm>
         </p:spPr>
         <p:txBody>
@@ -6392,8 +6424,8 @@
         </p:blipFill>
         <p:spPr>
           <a:xfrm>
-            <a:off x="1187624" y="2996952"/>
-            <a:ext cx="5915025" cy="3343275"/>
+            <a:off x="1835696" y="3068960"/>
+            <a:ext cx="5482977" cy="3099074"/>
           </a:xfrm>
           <a:prstGeom prst="rect">
             <a:avLst/>
@@ -6470,7 +6502,12 @@
             <p:ph idx="1"/>
           </p:nvPr>
         </p:nvSpPr>
-        <p:spPr/>
+        <p:spPr>
+          <a:xfrm>
+            <a:off x="683568" y="1700808"/>
+            <a:ext cx="7483475" cy="3772445"/>
+          </a:xfrm>
+        </p:spPr>
         <p:txBody>
           <a:bodyPr/>
           <a:lstStyle/>
@@ -6672,7 +6709,7 @@
           <a:effectLst/>
           <a:extLst>
             <a:ext uri="{AF507438-7753-43e0-B8FC-AC1667EBCBE1}">
-              <a14:hiddenEffects xmlns="" xmlns:a14="http://schemas.microsoft.com/office/drawing/2010/main">
+              <a14:hiddenEffects xmlns:a14="http://schemas.microsoft.com/office/drawing/2010/main" xmlns="">
                 <a:effectLst>
                   <a:outerShdw blurRad="63500" dist="38099" dir="2700000" algn="ctr" rotWithShape="0">
                     <a:schemeClr val="bg2">
@@ -6753,7 +6790,7 @@
           <a:effectLst/>
           <a:extLst>
             <a:ext uri="{AF507438-7753-43e0-B8FC-AC1667EBCBE1}">
-              <a14:hiddenEffects xmlns="" xmlns:a14="http://schemas.microsoft.com/office/drawing/2010/main">
+              <a14:hiddenEffects xmlns:a14="http://schemas.microsoft.com/office/drawing/2010/main" xmlns="">
                 <a:effectLst>
                   <a:outerShdw blurRad="63500" dist="38099" dir="2700000" algn="ctr" rotWithShape="0">
                     <a:schemeClr val="bg2">
@@ -6839,7 +6876,7 @@
           <a:effectLst/>
           <a:extLst>
             <a:ext uri="{AF507438-7753-43e0-B8FC-AC1667EBCBE1}">
-              <a14:hiddenEffects xmlns="" xmlns:a14="http://schemas.microsoft.com/office/drawing/2010/main">
+              <a14:hiddenEffects xmlns:a14="http://schemas.microsoft.com/office/drawing/2010/main" xmlns="">
                 <a:effectLst>
                   <a:outerShdw blurRad="63500" dist="38099" dir="2700000" algn="ctr" rotWithShape="0">
                     <a:schemeClr val="bg2">
@@ -6955,7 +6992,7 @@
           <a:effectLst/>
           <a:extLst>
             <a:ext uri="{AF507438-7753-43e0-B8FC-AC1667EBCBE1}">
-              <a14:hiddenEffects xmlns="" xmlns:a14="http://schemas.microsoft.com/office/drawing/2010/main">
+              <a14:hiddenEffects xmlns:a14="http://schemas.microsoft.com/office/drawing/2010/main" xmlns="">
                 <a:effectLst>
                   <a:outerShdw blurRad="63500" dist="38099" dir="2700000" algn="ctr" rotWithShape="0">
                     <a:schemeClr val="bg2">
@@ -7040,7 +7077,7 @@
         </p:nvSpPr>
         <p:spPr>
           <a:xfrm>
-            <a:off x="323528" y="4581128"/>
+            <a:off x="611560" y="4581128"/>
             <a:ext cx="7483475" cy="1348006"/>
           </a:xfrm>
         </p:spPr>
@@ -7111,7 +7148,7 @@
         </p:blipFill>
         <p:spPr>
           <a:xfrm>
-            <a:off x="899592" y="1528763"/>
+            <a:off x="1107901" y="1528763"/>
             <a:ext cx="6848475" cy="2771775"/>
           </a:xfrm>
           <a:prstGeom prst="rect">
@@ -7189,21 +7226,41 @@
             <p:ph idx="1"/>
           </p:nvPr>
         </p:nvSpPr>
-        <p:spPr/>
+        <p:spPr>
+          <a:xfrm>
+            <a:off x="971600" y="1988840"/>
+            <a:ext cx="7483475" cy="1756221"/>
+          </a:xfrm>
+        </p:spPr>
         <p:txBody>
           <a:bodyPr/>
           <a:lstStyle/>
           <a:p>
             <a:r>
               <a:rPr lang="en-GB" dirty="0" smtClean="0"/>
-              <a:t>Gone through this all very quickly</a:t>
-            </a:r>
+              <a:t>We’ve gone </a:t>
+            </a:r>
+            <a:r>
+              <a:rPr lang="en-GB" dirty="0" smtClean="0"/>
+              <a:t>through this all very </a:t>
+            </a:r>
+            <a:r>
+              <a:rPr lang="en-GB" dirty="0" smtClean="0"/>
+              <a:t>quickly</a:t>
+            </a:r>
+          </a:p>
+          <a:p>
+            <a:endParaRPr lang="en-GB" dirty="0" smtClean="0"/>
           </a:p>
           <a:p>
             <a:r>
               <a:rPr lang="en-GB" dirty="0" smtClean="0"/>
               <a:t>Don’t worry if it’s still a bit unclear, you only really learn by doing it </a:t>
             </a:r>
+            <a:endParaRPr lang="en-GB" dirty="0" smtClean="0"/>
+          </a:p>
+          <a:p>
+            <a:endParaRPr lang="en-GB" dirty="0" smtClean="0"/>
           </a:p>
           <a:p>
             <a:r>
@@ -7298,8 +7355,8 @@
         </p:nvSpPr>
         <p:spPr>
           <a:xfrm>
-            <a:off x="2149805" y="1916832"/>
-            <a:ext cx="5374523" cy="2062103"/>
+            <a:off x="1547664" y="2132856"/>
+            <a:ext cx="6480720" cy="2492990"/>
           </a:xfrm>
           <a:prstGeom prst="rect">
             <a:avLst/>
@@ -7359,12 +7416,9 @@
               <a:buFont typeface="Arial" panose="020B0604020202020204" pitchFamily="34" charset="0"/>
               <a:buChar char="•"/>
             </a:pPr>
-            <a:r>
-              <a:rPr lang="en-GB" sz="1400" dirty="0" smtClean="0">
-                <a:latin typeface="+mn-lt"/>
-              </a:rPr>
-              <a:t>Compilers and make</a:t>
-            </a:r>
+            <a:endParaRPr lang="en-GB" sz="1400" dirty="0" smtClean="0">
+              <a:latin typeface="+mn-lt"/>
+            </a:endParaRPr>
           </a:p>
           <a:p>
             <a:pPr marL="742950" lvl="1" indent="-285750">
@@ -7375,7 +7429,46 @@
               <a:rPr lang="en-GB" sz="1400" dirty="0" smtClean="0">
                 <a:latin typeface="+mn-lt"/>
               </a:rPr>
-              <a:t>A little bit about Arcus-b – the machine we will do the </a:t>
+              <a:t>Compilers and </a:t>
+            </a:r>
+            <a:r>
+              <a:rPr lang="en-GB" sz="1400" dirty="0" smtClean="0">
+                <a:latin typeface="+mn-lt"/>
+              </a:rPr>
+              <a:t>make</a:t>
+            </a:r>
+          </a:p>
+          <a:p>
+            <a:pPr marL="742950" lvl="1" indent="-285750">
+              <a:buFont typeface="Arial" panose="020B0604020202020204" pitchFamily="34" charset="0"/>
+              <a:buChar char="•"/>
+            </a:pPr>
+            <a:endParaRPr lang="en-GB" sz="1400" dirty="0" smtClean="0">
+              <a:latin typeface="+mn-lt"/>
+            </a:endParaRPr>
+          </a:p>
+          <a:p>
+            <a:pPr marL="742950" lvl="1" indent="-285750">
+              <a:buFont typeface="Arial" panose="020B0604020202020204" pitchFamily="34" charset="0"/>
+              <a:buChar char="•"/>
+            </a:pPr>
+            <a:r>
+              <a:rPr lang="en-GB" sz="1400" dirty="0" smtClean="0">
+                <a:latin typeface="+mn-lt"/>
+              </a:rPr>
+              <a:t>A little bit about Arcus-b – the machine </a:t>
+            </a:r>
+            <a:r>
+              <a:rPr lang="en-GB" sz="1400" dirty="0" smtClean="0">
+                <a:latin typeface="+mn-lt"/>
+              </a:rPr>
+              <a:t>that we </a:t>
+            </a:r>
+            <a:r>
+              <a:rPr lang="en-GB" sz="1400" dirty="0" smtClean="0">
+                <a:latin typeface="+mn-lt"/>
+              </a:rPr>
+              <a:t>will do the </a:t>
             </a:r>
             <a:r>
               <a:rPr lang="en-GB" sz="1400" dirty="0" err="1" smtClean="0">
@@ -7387,8 +7480,23 @@
               <a:rPr lang="en-GB" sz="1400" dirty="0" smtClean="0">
                 <a:latin typeface="+mn-lt"/>
               </a:rPr>
-              <a:t> on</a:t>
-            </a:r>
+              <a:t> </a:t>
+            </a:r>
+            <a:r>
+              <a:rPr lang="en-GB" sz="1400" dirty="0" smtClean="0">
+                <a:latin typeface="+mn-lt"/>
+              </a:rPr>
+              <a:t>on</a:t>
+            </a:r>
+          </a:p>
+          <a:p>
+            <a:pPr marL="742950" lvl="1" indent="-285750">
+              <a:buFont typeface="Arial" panose="020B0604020202020204" pitchFamily="34" charset="0"/>
+              <a:buChar char="•"/>
+            </a:pPr>
+            <a:endParaRPr lang="en-GB" sz="1400" dirty="0" smtClean="0">
+              <a:latin typeface="+mn-lt"/>
+            </a:endParaRPr>
           </a:p>
           <a:p>
             <a:pPr marL="742950" lvl="1" indent="-285750">
@@ -7506,7 +7614,7 @@
         <p:spPr>
           <a:xfrm>
             <a:off x="755576" y="1628800"/>
-            <a:ext cx="7776864" cy="2677656"/>
+            <a:ext cx="7776864" cy="4401205"/>
           </a:xfrm>
           <a:prstGeom prst="rect">
             <a:avLst/>
@@ -7531,7 +7639,17 @@
                 <a:latin typeface="Arial" panose="020B0604020202020204"/>
                 <a:cs typeface="Courier New" panose="02070309020205020404" pitchFamily="49" charset="0"/>
               </a:rPr>
-              <a:t>Linux is the OS most supercomputers use</a:t>
+              <a:t>Linux is the OS most supercomputers </a:t>
+            </a:r>
+            <a:r>
+              <a:rPr lang="en-GB" sz="1400" dirty="0" smtClean="0">
+                <a:solidFill>
+                  <a:srgbClr val="C2470C"/>
+                </a:solidFill>
+                <a:latin typeface="Arial" panose="020B0604020202020204"/>
+                <a:cs typeface="Courier New" panose="02070309020205020404" pitchFamily="49" charset="0"/>
+              </a:rPr>
+              <a:t>use</a:t>
             </a:r>
           </a:p>
           <a:p>
@@ -7539,16 +7657,13 @@
               <a:buFont typeface="Arial" panose="020B0604020202020204" pitchFamily="34" charset="0"/>
               <a:buChar char="•"/>
             </a:pPr>
-            <a:r>
-              <a:rPr lang="en-GB" sz="1400" dirty="0" smtClean="0">
-                <a:solidFill>
-                  <a:srgbClr val="C2470C"/>
-                </a:solidFill>
-                <a:latin typeface="Arial" panose="020B0604020202020204"/>
-                <a:cs typeface="Courier New" panose="02070309020205020404" pitchFamily="49" charset="0"/>
-              </a:rPr>
-              <a:t>You interact with it via the command line</a:t>
-            </a:r>
+            <a:endParaRPr lang="en-GB" sz="1400" dirty="0" smtClean="0">
+              <a:solidFill>
+                <a:srgbClr val="C2470C"/>
+              </a:solidFill>
+              <a:latin typeface="Arial" panose="020B0604020202020204"/>
+              <a:cs typeface="Courier New" panose="02070309020205020404" pitchFamily="49" charset="0"/>
+            </a:endParaRPr>
           </a:p>
           <a:p>
             <a:pPr marL="285750" indent="-285750">
@@ -7563,7 +7678,17 @@
                 <a:latin typeface="Arial" panose="020B0604020202020204"/>
                 <a:cs typeface="Courier New" panose="02070309020205020404" pitchFamily="49" charset="0"/>
               </a:rPr>
-              <a:t>There are many compilers, we will use the Gnu and Intel ones</a:t>
+              <a:t>You interact with it via the command </a:t>
+            </a:r>
+            <a:r>
+              <a:rPr lang="en-GB" sz="1400" dirty="0" smtClean="0">
+                <a:solidFill>
+                  <a:srgbClr val="C2470C"/>
+                </a:solidFill>
+                <a:latin typeface="Arial" panose="020B0604020202020204"/>
+                <a:cs typeface="Courier New" panose="02070309020205020404" pitchFamily="49" charset="0"/>
+              </a:rPr>
+              <a:t>line</a:t>
             </a:r>
           </a:p>
           <a:p>
@@ -7571,16 +7696,13 @@
               <a:buFont typeface="Arial" panose="020B0604020202020204" pitchFamily="34" charset="0"/>
               <a:buChar char="•"/>
             </a:pPr>
-            <a:r>
-              <a:rPr lang="en-GB" sz="1400" dirty="0" smtClean="0">
-                <a:solidFill>
-                  <a:srgbClr val="C2470C"/>
-                </a:solidFill>
-                <a:latin typeface="Arial" panose="020B0604020202020204"/>
-                <a:cs typeface="Courier New" panose="02070309020205020404" pitchFamily="49" charset="0"/>
-              </a:rPr>
-              <a:t>Compilation is really two phases, compilation to an object file, and then linking the object files together to produce the executable</a:t>
-            </a:r>
+            <a:endParaRPr lang="en-GB" sz="1400" dirty="0" smtClean="0">
+              <a:solidFill>
+                <a:srgbClr val="C2470C"/>
+              </a:solidFill>
+              <a:latin typeface="Arial" panose="020B0604020202020204"/>
+              <a:cs typeface="Courier New" panose="02070309020205020404" pitchFamily="49" charset="0"/>
+            </a:endParaRPr>
           </a:p>
           <a:p>
             <a:pPr marL="285750" indent="-285750">
@@ -7595,7 +7717,17 @@
                 <a:latin typeface="Arial" panose="020B0604020202020204"/>
                 <a:cs typeface="Courier New" panose="02070309020205020404" pitchFamily="49" charset="0"/>
               </a:rPr>
-              <a:t>The make utility can take advantage of this to speed up compilation, especially for large projects</a:t>
+              <a:t>There are many compilers, we will use the Gnu and Intel </a:t>
+            </a:r>
+            <a:r>
+              <a:rPr lang="en-GB" sz="1400" dirty="0" smtClean="0">
+                <a:solidFill>
+                  <a:srgbClr val="C2470C"/>
+                </a:solidFill>
+                <a:latin typeface="Arial" panose="020B0604020202020204"/>
+                <a:cs typeface="Courier New" panose="02070309020205020404" pitchFamily="49" charset="0"/>
+              </a:rPr>
+              <a:t>ones</a:t>
             </a:r>
           </a:p>
           <a:p>
@@ -7603,16 +7735,13 @@
               <a:buFont typeface="Arial" panose="020B0604020202020204" pitchFamily="34" charset="0"/>
               <a:buChar char="•"/>
             </a:pPr>
-            <a:r>
-              <a:rPr lang="en-GB" sz="1400" dirty="0" smtClean="0">
-                <a:solidFill>
-                  <a:srgbClr val="C2470C"/>
-                </a:solidFill>
-                <a:latin typeface="Arial" panose="020B0604020202020204"/>
-                <a:cs typeface="Courier New" panose="02070309020205020404" pitchFamily="49" charset="0"/>
-              </a:rPr>
-              <a:t>Arcus-b is the cluster we will use</a:t>
-            </a:r>
+            <a:endParaRPr lang="en-GB" sz="1400" dirty="0" smtClean="0">
+              <a:solidFill>
+                <a:srgbClr val="C2470C"/>
+              </a:solidFill>
+              <a:latin typeface="Arial" panose="020B0604020202020204"/>
+              <a:cs typeface="Courier New" panose="02070309020205020404" pitchFamily="49" charset="0"/>
+            </a:endParaRPr>
           </a:p>
           <a:p>
             <a:pPr marL="285750" indent="-285750">
@@ -7627,7 +7756,17 @@
                 <a:latin typeface="Arial" panose="020B0604020202020204"/>
                 <a:cs typeface="Courier New" panose="02070309020205020404" pitchFamily="49" charset="0"/>
               </a:rPr>
-              <a:t>It has 16 cores per node</a:t>
+              <a:t>Compilation is really two phases, compilation to an object file, and then linking the object files together to produce the </a:t>
+            </a:r>
+            <a:r>
+              <a:rPr lang="en-GB" sz="1400" dirty="0" smtClean="0">
+                <a:solidFill>
+                  <a:srgbClr val="C2470C"/>
+                </a:solidFill>
+                <a:latin typeface="Arial" panose="020B0604020202020204"/>
+                <a:cs typeface="Courier New" panose="02070309020205020404" pitchFamily="49" charset="0"/>
+              </a:rPr>
+              <a:t>executable</a:t>
             </a:r>
           </a:p>
           <a:p>
@@ -7635,6 +7774,19 @@
               <a:buFont typeface="Arial" panose="020B0604020202020204" pitchFamily="34" charset="0"/>
               <a:buChar char="•"/>
             </a:pPr>
+            <a:endParaRPr lang="en-GB" sz="1400" dirty="0" smtClean="0">
+              <a:solidFill>
+                <a:srgbClr val="C2470C"/>
+              </a:solidFill>
+              <a:latin typeface="Arial" panose="020B0604020202020204"/>
+              <a:cs typeface="Courier New" panose="02070309020205020404" pitchFamily="49" charset="0"/>
+            </a:endParaRPr>
+          </a:p>
+          <a:p>
+            <a:pPr marL="285750" indent="-285750">
+              <a:buFont typeface="Arial" panose="020B0604020202020204" pitchFamily="34" charset="0"/>
+              <a:buChar char="•"/>
+            </a:pPr>
             <a:r>
               <a:rPr lang="en-GB" sz="1400" dirty="0" smtClean="0">
                 <a:solidFill>
@@ -7643,8 +7795,168 @@
                 <a:latin typeface="Arial" panose="020B0604020202020204"/>
                 <a:cs typeface="Courier New" panose="02070309020205020404" pitchFamily="49" charset="0"/>
               </a:rPr>
-              <a:t>The software environment is managed via the module system</a:t>
-            </a:r>
+              <a:t>The make utility can take advantage of this to speed </a:t>
+            </a:r>
+            <a:r>
+              <a:rPr lang="en-GB" sz="1400" dirty="0" smtClean="0">
+                <a:solidFill>
+                  <a:srgbClr val="C2470C"/>
+                </a:solidFill>
+                <a:latin typeface="Arial" panose="020B0604020202020204"/>
+                <a:cs typeface="Courier New" panose="02070309020205020404" pitchFamily="49" charset="0"/>
+              </a:rPr>
+              <a:t>up </a:t>
+            </a:r>
+            <a:r>
+              <a:rPr lang="en-GB" sz="1400" dirty="0" smtClean="0">
+                <a:solidFill>
+                  <a:srgbClr val="C2470C"/>
+                </a:solidFill>
+                <a:latin typeface="Arial" panose="020B0604020202020204"/>
+                <a:cs typeface="Courier New" panose="02070309020205020404" pitchFamily="49" charset="0"/>
+              </a:rPr>
+              <a:t>compilation, especially for large </a:t>
+            </a:r>
+            <a:r>
+              <a:rPr lang="en-GB" sz="1400" dirty="0" smtClean="0">
+                <a:solidFill>
+                  <a:srgbClr val="C2470C"/>
+                </a:solidFill>
+                <a:latin typeface="Arial" panose="020B0604020202020204"/>
+                <a:cs typeface="Courier New" panose="02070309020205020404" pitchFamily="49" charset="0"/>
+              </a:rPr>
+              <a:t>projects</a:t>
+            </a:r>
+          </a:p>
+          <a:p>
+            <a:pPr marL="285750" indent="-285750">
+              <a:buFont typeface="Arial" panose="020B0604020202020204" pitchFamily="34" charset="0"/>
+              <a:buChar char="•"/>
+            </a:pPr>
+            <a:endParaRPr lang="en-GB" sz="1400" dirty="0" smtClean="0">
+              <a:solidFill>
+                <a:srgbClr val="C2470C"/>
+              </a:solidFill>
+              <a:latin typeface="Arial" panose="020B0604020202020204"/>
+              <a:cs typeface="Courier New" panose="02070309020205020404" pitchFamily="49" charset="0"/>
+            </a:endParaRPr>
+          </a:p>
+          <a:p>
+            <a:pPr marL="285750" indent="-285750">
+              <a:buFont typeface="Arial" panose="020B0604020202020204" pitchFamily="34" charset="0"/>
+              <a:buChar char="•"/>
+            </a:pPr>
+            <a:r>
+              <a:rPr lang="en-GB" sz="1400" dirty="0" smtClean="0">
+                <a:solidFill>
+                  <a:srgbClr val="C2470C"/>
+                </a:solidFill>
+                <a:latin typeface="Arial" panose="020B0604020202020204"/>
+                <a:cs typeface="Courier New" panose="02070309020205020404" pitchFamily="49" charset="0"/>
+              </a:rPr>
+              <a:t>Arcus-b is the cluster we will </a:t>
+            </a:r>
+            <a:r>
+              <a:rPr lang="en-GB" sz="1400" dirty="0" smtClean="0">
+                <a:solidFill>
+                  <a:srgbClr val="C2470C"/>
+                </a:solidFill>
+                <a:latin typeface="Arial" panose="020B0604020202020204"/>
+                <a:cs typeface="Courier New" panose="02070309020205020404" pitchFamily="49" charset="0"/>
+              </a:rPr>
+              <a:t>use</a:t>
+            </a:r>
+          </a:p>
+          <a:p>
+            <a:pPr marL="285750" indent="-285750">
+              <a:buFont typeface="Arial" panose="020B0604020202020204" pitchFamily="34" charset="0"/>
+              <a:buChar char="•"/>
+            </a:pPr>
+            <a:endParaRPr lang="en-GB" sz="1400" dirty="0" smtClean="0">
+              <a:solidFill>
+                <a:srgbClr val="C2470C"/>
+              </a:solidFill>
+              <a:latin typeface="Arial" panose="020B0604020202020204"/>
+              <a:cs typeface="Courier New" panose="02070309020205020404" pitchFamily="49" charset="0"/>
+            </a:endParaRPr>
+          </a:p>
+          <a:p>
+            <a:pPr marL="285750" indent="-285750">
+              <a:buFont typeface="Arial" panose="020B0604020202020204" pitchFamily="34" charset="0"/>
+              <a:buChar char="•"/>
+            </a:pPr>
+            <a:r>
+              <a:rPr lang="en-GB" sz="1400" dirty="0" smtClean="0">
+                <a:solidFill>
+                  <a:srgbClr val="C2470C"/>
+                </a:solidFill>
+                <a:latin typeface="Arial" panose="020B0604020202020204"/>
+                <a:cs typeface="Courier New" panose="02070309020205020404" pitchFamily="49" charset="0"/>
+              </a:rPr>
+              <a:t>It has 16 cores per </a:t>
+            </a:r>
+            <a:r>
+              <a:rPr lang="en-GB" sz="1400" dirty="0" smtClean="0">
+                <a:solidFill>
+                  <a:srgbClr val="C2470C"/>
+                </a:solidFill>
+                <a:latin typeface="Arial" panose="020B0604020202020204"/>
+                <a:cs typeface="Courier New" panose="02070309020205020404" pitchFamily="49" charset="0"/>
+              </a:rPr>
+              <a:t>node</a:t>
+            </a:r>
+          </a:p>
+          <a:p>
+            <a:pPr marL="285750" indent="-285750">
+              <a:buFont typeface="Arial" panose="020B0604020202020204" pitchFamily="34" charset="0"/>
+              <a:buChar char="•"/>
+            </a:pPr>
+            <a:endParaRPr lang="en-GB" sz="1400" dirty="0" smtClean="0">
+              <a:solidFill>
+                <a:srgbClr val="C2470C"/>
+              </a:solidFill>
+              <a:latin typeface="Arial" panose="020B0604020202020204"/>
+              <a:cs typeface="Courier New" panose="02070309020205020404" pitchFamily="49" charset="0"/>
+            </a:endParaRPr>
+          </a:p>
+          <a:p>
+            <a:pPr marL="285750" indent="-285750">
+              <a:buFont typeface="Arial" panose="020B0604020202020204" pitchFamily="34" charset="0"/>
+              <a:buChar char="•"/>
+            </a:pPr>
+            <a:r>
+              <a:rPr lang="en-GB" sz="1400" dirty="0" smtClean="0">
+                <a:solidFill>
+                  <a:srgbClr val="C2470C"/>
+                </a:solidFill>
+                <a:latin typeface="Arial" panose="020B0604020202020204"/>
+                <a:cs typeface="Courier New" panose="02070309020205020404" pitchFamily="49" charset="0"/>
+              </a:rPr>
+              <a:t>The software environment is managed via the module </a:t>
+            </a:r>
+            <a:r>
+              <a:rPr lang="en-GB" sz="1400" dirty="0" smtClean="0">
+                <a:solidFill>
+                  <a:srgbClr val="C2470C"/>
+                </a:solidFill>
+                <a:latin typeface="Arial" panose="020B0604020202020204"/>
+                <a:cs typeface="Courier New" panose="02070309020205020404" pitchFamily="49" charset="0"/>
+              </a:rPr>
+              <a:t>system</a:t>
+            </a:r>
+          </a:p>
+          <a:p>
+            <a:pPr marL="285750" indent="-285750">
+              <a:buFont typeface="Arial" panose="020B0604020202020204" pitchFamily="34" charset="0"/>
+              <a:buChar char="•"/>
+            </a:pPr>
+            <a:endParaRPr lang="en-GB" sz="1400" dirty="0" smtClean="0">
+              <a:solidFill>
+                <a:srgbClr val="C2470C"/>
+              </a:solidFill>
+              <a:latin typeface="Arial" panose="020B0604020202020204"/>
+              <a:cs typeface="Courier New" panose="02070309020205020404" pitchFamily="49" charset="0"/>
+            </a:endParaRPr>
           </a:p>
           <a:p>
             <a:pPr marL="285750" indent="-285750">
@@ -7963,7 +8275,12 @@
             <p:ph idx="1"/>
           </p:nvPr>
         </p:nvSpPr>
-        <p:spPr/>
+        <p:spPr>
+          <a:xfrm>
+            <a:off x="755576" y="1700808"/>
+            <a:ext cx="7483475" cy="3340397"/>
+          </a:xfrm>
+        </p:spPr>
         <p:txBody>
           <a:bodyPr/>
           <a:lstStyle/>
@@ -7977,21 +8294,45 @@
             <a:pPr lvl="1"/>
             <a:r>
               <a:rPr lang="en-GB" dirty="0" smtClean="0"/>
-              <a:t>Derived ultimately from Unix</a:t>
-            </a:r>
-          </a:p>
-          <a:p>
-            <a:r>
-              <a:rPr lang="en-GB" dirty="0" smtClean="0"/>
-              <a:t>For us that controls how we interact with the machine</a:t>
+              <a:t>Derived ultimately from </a:t>
+            </a:r>
+            <a:r>
+              <a:rPr lang="en-GB" dirty="0" smtClean="0"/>
+              <a:t>Unix</a:t>
             </a:r>
           </a:p>
           <a:p>
             <a:pPr lvl="1"/>
-            <a:r>
-              <a:rPr lang="en-GB" dirty="0" smtClean="0"/>
-              <a:t>You are probably more used to Microsoft Windows or OS X on a Mac</a:t>
-            </a:r>
+            <a:endParaRPr lang="en-GB" dirty="0" smtClean="0"/>
+          </a:p>
+          <a:p>
+            <a:r>
+              <a:rPr lang="en-GB" dirty="0" smtClean="0"/>
+              <a:t>For </a:t>
+            </a:r>
+            <a:r>
+              <a:rPr lang="en-GB" dirty="0" smtClean="0"/>
+              <a:t>us, </a:t>
+            </a:r>
+            <a:r>
+              <a:rPr lang="en-GB" dirty="0" smtClean="0"/>
+              <a:t>that controls how we interact with the machine</a:t>
+            </a:r>
+          </a:p>
+          <a:p>
+            <a:pPr lvl="1"/>
+            <a:r>
+              <a:rPr lang="en-GB" dirty="0" smtClean="0"/>
+              <a:t>You are probably more used to Microsoft Windows or OS X on a </a:t>
+            </a:r>
+            <a:r>
+              <a:rPr lang="en-GB" dirty="0" smtClean="0"/>
+              <a:t>Mac</a:t>
+            </a:r>
+          </a:p>
+          <a:p>
+            <a:pPr lvl="1"/>
+            <a:endParaRPr lang="en-GB" dirty="0" smtClean="0"/>
           </a:p>
           <a:p>
             <a:r>
@@ -8003,8 +8344,16 @@
             <a:pPr lvl="1"/>
             <a:r>
               <a:rPr lang="en-GB" dirty="0" smtClean="0"/>
-              <a:t>But note under the hood OS X is also derived from Unix</a:t>
-            </a:r>
+              <a:t>But note under the hood OS X is also derived from </a:t>
+            </a:r>
+            <a:r>
+              <a:rPr lang="en-GB" dirty="0" smtClean="0"/>
+              <a:t>Unix</a:t>
+            </a:r>
+          </a:p>
+          <a:p>
+            <a:pPr lvl="1"/>
+            <a:endParaRPr lang="en-GB" dirty="0" smtClean="0"/>
           </a:p>
           <a:p>
             <a:r>
@@ -8094,8 +8443,8 @@
         </p:nvSpPr>
         <p:spPr>
           <a:xfrm>
-            <a:off x="379413" y="1528763"/>
-            <a:ext cx="7483475" cy="532085"/>
+            <a:off x="539552" y="1484784"/>
+            <a:ext cx="7483475" cy="2404293"/>
           </a:xfrm>
         </p:spPr>
         <p:txBody>
@@ -8112,8 +8461,15 @@
             </a:r>
             <a:r>
               <a:rPr lang="en-GB" dirty="0" smtClean="0"/>
-              <a:t> command</a:t>
-            </a:r>
+              <a:t> </a:t>
+            </a:r>
+            <a:r>
+              <a:rPr lang="en-GB" dirty="0" smtClean="0"/>
+              <a:t>command</a:t>
+            </a:r>
+          </a:p>
+          <a:p>
+            <a:endParaRPr lang="en-GB" dirty="0" smtClean="0"/>
           </a:p>
           <a:p>
             <a:r>
@@ -8126,8 +8482,15 @@
             </a:r>
             <a:r>
               <a:rPr lang="en-GB" dirty="0" smtClean="0"/>
-              <a:t> on arcus-b, the University’s central compute cluster run by ARC</a:t>
-            </a:r>
+              <a:t> on arcus-b, the University’s central compute cluster run by </a:t>
+            </a:r>
+            <a:r>
+              <a:rPr lang="en-GB" dirty="0" smtClean="0"/>
+              <a:t>ARC</a:t>
+            </a:r>
+          </a:p>
+          <a:p>
+            <a:endParaRPr lang="en-GB" dirty="0" smtClean="0"/>
           </a:p>
           <a:p>
             <a:r>
@@ -8191,8 +8554,8 @@
         </p:blipFill>
         <p:spPr>
           <a:xfrm>
-            <a:off x="0" y="3356992"/>
-            <a:ext cx="9144000" cy="2214000"/>
+            <a:off x="287524" y="4005064"/>
+            <a:ext cx="8568952" cy="2074765"/>
           </a:xfrm>
           <a:prstGeom prst="rect">
             <a:avLst/>
@@ -8269,15 +8632,27 @@
             <p:ph idx="1"/>
           </p:nvPr>
         </p:nvSpPr>
-        <p:spPr/>
+        <p:spPr>
+          <a:xfrm>
+            <a:off x="468313" y="1340768"/>
+            <a:ext cx="8064127" cy="4391025"/>
+          </a:xfrm>
+        </p:spPr>
         <p:txBody>
           <a:bodyPr/>
           <a:lstStyle/>
           <a:p>
             <a:r>
               <a:rPr lang="en-GB" dirty="0" smtClean="0"/>
-              <a:t>You only really learn this stuff by doing it</a:t>
-            </a:r>
+              <a:t>You only really learn this stuff by doing </a:t>
+            </a:r>
+            <a:r>
+              <a:rPr lang="en-GB" dirty="0" smtClean="0"/>
+              <a:t>it</a:t>
+            </a:r>
+          </a:p>
+          <a:p>
+            <a:endParaRPr lang="en-GB" dirty="0" smtClean="0"/>
           </a:p>
           <a:p>
             <a:r>
@@ -8285,19 +8660,33 @@
               <a:t>Hence rather than go through all of numerous command in Linux there is a worksheet which will be part of the practical where you will </a:t>
             </a:r>
             <a:r>
-              <a:rPr lang="en-GB" dirty="0" err="1" smtClean="0"/>
-              <a:t>leanr</a:t>
-            </a:r>
-            <a:r>
-              <a:rPr lang="en-GB" dirty="0" smtClean="0"/>
-              <a:t> what you need</a:t>
-            </a:r>
-          </a:p>
-          <a:p>
-            <a:r>
-              <a:rPr lang="en-GB" dirty="0" smtClean="0"/>
-              <a:t>However it’s worth noting that the Unix, and hence Linux, philosophy is a bit different from that found in Windows</a:t>
-            </a:r>
+              <a:rPr lang="en-GB" dirty="0" smtClean="0"/>
+              <a:t>learn </a:t>
+            </a:r>
+            <a:r>
+              <a:rPr lang="en-GB" dirty="0" smtClean="0"/>
+              <a:t>what you </a:t>
+            </a:r>
+            <a:r>
+              <a:rPr lang="en-GB" dirty="0" smtClean="0"/>
+              <a:t>need</a:t>
+            </a:r>
+          </a:p>
+          <a:p>
+            <a:endParaRPr lang="en-GB" dirty="0" smtClean="0"/>
+          </a:p>
+          <a:p>
+            <a:r>
+              <a:rPr lang="en-GB" dirty="0" smtClean="0"/>
+              <a:t>However it’s worth noting that the Unix, and hence Linux, philosophy is a bit different from that found in </a:t>
+            </a:r>
+            <a:r>
+              <a:rPr lang="en-GB" dirty="0" smtClean="0"/>
+              <a:t>Windows</a:t>
+            </a:r>
+          </a:p>
+          <a:p>
+            <a:endParaRPr lang="en-GB" dirty="0" smtClean="0"/>
           </a:p>
           <a:p>
             <a:r>
@@ -8309,8 +8698,16 @@
             <a:pPr lvl="1"/>
             <a:r>
               <a:rPr lang="en-GB" dirty="0" smtClean="0"/>
-              <a:t>This is flexible and can do many things, but can take a while to learn</a:t>
-            </a:r>
+              <a:t>This is flexible and can do many things, but can take a while to </a:t>
+            </a:r>
+            <a:r>
+              <a:rPr lang="en-GB" dirty="0" smtClean="0"/>
+              <a:t>learn</a:t>
+            </a:r>
+          </a:p>
+          <a:p>
+            <a:pPr lvl="1"/>
+            <a:endParaRPr lang="en-GB" dirty="0" smtClean="0"/>
           </a:p>
           <a:p>
             <a:r>
@@ -8329,8 +8726,16 @@
             <a:pPr lvl="1"/>
             <a:r>
               <a:rPr lang="en-GB" dirty="0" smtClean="0"/>
-              <a:t>But not great once you stray outside those bounds</a:t>
-            </a:r>
+              <a:t>But not great once you stray outside those </a:t>
+            </a:r>
+            <a:r>
+              <a:rPr lang="en-GB" dirty="0" smtClean="0"/>
+              <a:t>bounds</a:t>
+            </a:r>
+          </a:p>
+          <a:p>
+            <a:pPr lvl="1"/>
+            <a:endParaRPr lang="en-GB" dirty="0" smtClean="0"/>
           </a:p>
           <a:p>
             <a:r>
@@ -8532,15 +8937,27 @@
             <p:ph idx="1"/>
           </p:nvPr>
         </p:nvSpPr>
-        <p:spPr/>
+        <p:spPr>
+          <a:xfrm>
+            <a:off x="379413" y="1528763"/>
+            <a:ext cx="8009011" cy="4391025"/>
+          </a:xfrm>
+        </p:spPr>
         <p:txBody>
           <a:bodyPr/>
           <a:lstStyle/>
           <a:p>
             <a:r>
               <a:rPr lang="en-GB" dirty="0" smtClean="0"/>
-              <a:t>There are many compilers available under Linux</a:t>
-            </a:r>
+              <a:t>There are many compilers available under </a:t>
+            </a:r>
+            <a:r>
+              <a:rPr lang="en-GB" dirty="0" smtClean="0"/>
+              <a:t>Linux</a:t>
+            </a:r>
+          </a:p>
+          <a:p>
+            <a:endParaRPr lang="en-GB" dirty="0" smtClean="0"/>
           </a:p>
           <a:p>
             <a:r>
@@ -8710,7 +9127,15 @@
             <a:pPr lvl="1"/>
             <a:r>
               <a:rPr lang="en-GB" dirty="0" smtClean="0"/>
-              <a:t>You should always end your C files names with </a:t>
+              <a:t>You should always end your C </a:t>
+            </a:r>
+            <a:r>
+              <a:rPr lang="en-GB" dirty="0" smtClean="0"/>
+              <a:t>file </a:t>
+            </a:r>
+            <a:r>
+              <a:rPr lang="en-GB" dirty="0" smtClean="0"/>
+              <a:t>names with </a:t>
             </a:r>
             <a:r>
               <a:rPr lang="en-GB" dirty="0" smtClean="0">
@@ -8762,8 +9187,8 @@
         </p:blipFill>
         <p:spPr>
           <a:xfrm>
-            <a:off x="1623914" y="1293169"/>
-            <a:ext cx="5252342" cy="3197670"/>
+            <a:off x="2411760" y="1556792"/>
+            <a:ext cx="4819327" cy="2934047"/>
           </a:xfrm>
           <a:prstGeom prst="rect">
             <a:avLst/>
@@ -8888,8 +9313,8 @@
         </p:blipFill>
         <p:spPr>
           <a:xfrm>
-            <a:off x="1691680" y="1406222"/>
-            <a:ext cx="4991744" cy="3323310"/>
+            <a:off x="2483768" y="1556792"/>
+            <a:ext cx="4559696" cy="3035669"/>
           </a:xfrm>
           <a:prstGeom prst="rect">
             <a:avLst/>
@@ -9222,7 +9647,7 @@
         <a:effectLst/>
         <a:extLst>
           <a:ext uri="{AF507438-7753-43e0-B8FC-AC1667EBCBE1}">
-            <a14:hiddenEffects xmlns="" xmlns:a14="http://schemas.microsoft.com/office/drawing/2010/main">
+            <a14:hiddenEffects xmlns:a14="http://schemas.microsoft.com/office/drawing/2010/main" xmlns="">
               <a:effectLst>
                 <a:outerShdw blurRad="63500" dist="38099" dir="2700000" algn="ctr" rotWithShape="0">
                   <a:schemeClr val="bg2">
@@ -9298,7 +9723,7 @@
         <a:effectLst/>
         <a:extLst>
           <a:ext uri="{AF507438-7753-43e0-B8FC-AC1667EBCBE1}">
-            <a14:hiddenEffects xmlns="" xmlns:a14="http://schemas.microsoft.com/office/drawing/2010/main">
+            <a14:hiddenEffects xmlns:a14="http://schemas.microsoft.com/office/drawing/2010/main" xmlns="">
               <a:effectLst>
                 <a:outerShdw blurRad="63500" dist="38099" dir="2700000" algn="ctr" rotWithShape="0">
                   <a:schemeClr val="bg2">
@@ -10361,12 +10786,12 @@
 </file>
 
 <file path=customXml/item1.xml><?xml version="1.0" encoding="utf-8"?>
-<?mso-contentType ?>
-<FormTemplates xmlns="http://schemas.microsoft.com/sharepoint/v3/contenttype/forms">
-  <Display>DocumentLibraryForm</Display>
-  <Edit>DocumentLibraryForm</Edit>
-  <New>DocumentLibraryForm</New>
-</FormTemplates>
+<p:properties xmlns:p="http://schemas.microsoft.com/office/2006/metadata/properties" xmlns:xsi="http://www.w3.org/2001/XMLSchema-instance" xmlns:pc="http://schemas.microsoft.com/office/infopath/2007/PartnerControls">
+  <documentManagement>
+    <PublishingExpirationDate xmlns="http://schemas.microsoft.com/sharepoint/v3" xsi:nil="true"/>
+    <PublishingStartDate xmlns="http://schemas.microsoft.com/sharepoint/v3" xsi:nil="true"/>
+  </documentManagement>
+</p:properties>
 </file>
 
 <file path=customXml/item2.xml><?xml version="1.0" encoding="utf-8"?>
@@ -10502,18 +10927,26 @@
 </file>
 
 <file path=customXml/item3.xml><?xml version="1.0" encoding="utf-8"?>
-<p:properties xmlns:p="http://schemas.microsoft.com/office/2006/metadata/properties" xmlns:xsi="http://www.w3.org/2001/XMLSchema-instance" xmlns:pc="http://schemas.microsoft.com/office/infopath/2007/PartnerControls">
-  <documentManagement>
-    <PublishingExpirationDate xmlns="http://schemas.microsoft.com/sharepoint/v3" xsi:nil="true"/>
-    <PublishingStartDate xmlns="http://schemas.microsoft.com/sharepoint/v3" xsi:nil="true"/>
-  </documentManagement>
-</p:properties>
+<?mso-contentType ?>
+<FormTemplates xmlns="http://schemas.microsoft.com/sharepoint/v3/contenttype/forms">
+  <Display>DocumentLibraryForm</Display>
+  <Edit>DocumentLibraryForm</Edit>
+  <New>DocumentLibraryForm</New>
+</FormTemplates>
 </file>
 
 <file path=customXml/itemProps1.xml><?xml version="1.0" encoding="utf-8"?>
-<ds:datastoreItem xmlns:ds="http://schemas.openxmlformats.org/officeDocument/2006/customXml" ds:itemID="{2E0637EC-CEA5-409F-B139-003005A14145}">
+<ds:datastoreItem xmlns:ds="http://schemas.openxmlformats.org/officeDocument/2006/customXml" ds:itemID="{D83787E9-855B-43BD-8382-B7C63B9BC33D}">
   <ds:schemaRefs>
-    <ds:schemaRef ds:uri="http://schemas.microsoft.com/sharepoint/v3/contenttype/forms"/>
+    <ds:schemaRef ds:uri="http://schemas.microsoft.com/office/2006/documentManagement/types"/>
+    <ds:schemaRef ds:uri="http://schemas.microsoft.com/office/infopath/2007/PartnerControls"/>
+    <ds:schemaRef ds:uri="http://purl.org/dc/elements/1.1/"/>
+    <ds:schemaRef ds:uri="http://schemas.microsoft.com/office/2006/metadata/properties"/>
+    <ds:schemaRef ds:uri="http://schemas.microsoft.com/sharepoint/v3"/>
+    <ds:schemaRef ds:uri="http://purl.org/dc/terms/"/>
+    <ds:schemaRef ds:uri="http://schemas.openxmlformats.org/package/2006/metadata/core-properties"/>
+    <ds:schemaRef ds:uri="http://www.w3.org/XML/1998/namespace"/>
+    <ds:schemaRef ds:uri="http://purl.org/dc/dcmitype/"/>
   </ds:schemaRefs>
 </ds:datastoreItem>
 </file>
@@ -10537,17 +10970,9 @@
 </file>
 
 <file path=customXml/itemProps3.xml><?xml version="1.0" encoding="utf-8"?>
-<ds:datastoreItem xmlns:ds="http://schemas.openxmlformats.org/officeDocument/2006/customXml" ds:itemID="{D83787E9-855B-43BD-8382-B7C63B9BC33D}">
+<ds:datastoreItem xmlns:ds="http://schemas.openxmlformats.org/officeDocument/2006/customXml" ds:itemID="{2E0637EC-CEA5-409F-B139-003005A14145}">
   <ds:schemaRefs>
-    <ds:schemaRef ds:uri="http://schemas.microsoft.com/office/2006/documentManagement/types"/>
-    <ds:schemaRef ds:uri="http://schemas.microsoft.com/office/infopath/2007/PartnerControls"/>
-    <ds:schemaRef ds:uri="http://purl.org/dc/elements/1.1/"/>
-    <ds:schemaRef ds:uri="http://schemas.microsoft.com/office/2006/metadata/properties"/>
-    <ds:schemaRef ds:uri="http://schemas.microsoft.com/sharepoint/v3"/>
-    <ds:schemaRef ds:uri="http://purl.org/dc/terms/"/>
-    <ds:schemaRef ds:uri="http://schemas.openxmlformats.org/package/2006/metadata/core-properties"/>
-    <ds:schemaRef ds:uri="http://www.w3.org/XML/1998/namespace"/>
-    <ds:schemaRef ds:uri="http://purl.org/dc/dcmitype/"/>
+    <ds:schemaRef ds:uri="http://schemas.microsoft.com/sharepoint/v3/contenttype/forms"/>
   </ds:schemaRefs>
 </ds:datastoreItem>
 </file>
</xml_diff>